<commit_message>
ide01 tainingskarte layout angepasst
</commit_message>
<xml_diff>
--- a/agile moves/Ideas (IDE)/ger_IDE_01_Verantwortung_beginnt_mit einer_Idee.pptx
+++ b/agile moves/Ideas (IDE)/ger_IDE_01_Verantwortung_beginnt_mit einer_Idee.pptx
@@ -1189,8 +1189,8 @@
                 <a:solidFill>
                   <a:schemeClr val="bg1"/>
                 </a:solidFill>
-                <a:latin typeface="Avenir Book"/>
-                <a:cs typeface="Avenir Book"/>
+                <a:latin typeface="Avenir Heavy"/>
+                <a:cs typeface="Avenir Heavy"/>
               </a:rPr>
               <a:t>IDE</a:t>
             </a:r>
@@ -1846,15 +1846,7 @@
                   <a:srgbClr val="747982"/>
                 </a:solidFill>
               </a:rPr>
-              <a:t>wie</a:t>
-            </a:r>
-            <a:r>
-              <a:rPr lang="de-DE" dirty="0" smtClean="0">
-                <a:solidFill>
-                  <a:srgbClr val="747982"/>
-                </a:solidFill>
-              </a:rPr>
-              <a:t>:</a:t>
+              <a:t>wie:</a:t>
             </a:r>
             <a:endParaRPr lang="de-DE" dirty="0">
               <a:solidFill>
@@ -2029,15 +2021,7 @@
                   <a:srgbClr val="747982"/>
                 </a:solidFill>
               </a:rPr>
-              <a:t>Ziel ist </a:t>
-            </a:r>
-            <a:r>
-              <a:rPr lang="de-DE" dirty="0" smtClean="0">
-                <a:solidFill>
-                  <a:srgbClr val="747982"/>
-                </a:solidFill>
-              </a:rPr>
-              <a:t>es, alle </a:t>
+              <a:t>Ziel ist es, alle </a:t>
             </a:r>
             <a:r>
               <a:rPr lang="de-DE" dirty="0">

</xml_diff>